<commit_message>
Deployed 273c05f with MkDocs version: 1.3.1
</commit_message>
<xml_diff>
--- a/aulas/06-heuristicas/slides.pptx
+++ b/aulas/06-heuristicas/slides.pptx
@@ -282,6 +282,485 @@
 <file path=ppt/changesInfos/changesInfo1.xml><?xml version="1.0" encoding="utf-8"?>
 <pc:chgInfo xmlns:a="http://schemas.openxmlformats.org/drawingml/2006/main" xmlns:r="http://schemas.openxmlformats.org/officeDocument/2006/relationships" xmlns:ac="http://schemas.microsoft.com/office/drawing/2013/main/command" xmlns:pc="http://schemas.microsoft.com/office/powerpoint/2013/main/command">
   <pc:docChgLst>
+    <pc:chgData name="Luciano Pereira Soares" userId="16c53e34-c952-423e-8700-c0525d23304f" providerId="ADAL" clId="{21D76053-4FC2-8046-8E35-708C3EA86774}"/>
+    <pc:docChg chg="custSel delSld modSld modSection">
+      <pc:chgData name="Luciano Pereira Soares" userId="16c53e34-c952-423e-8700-c0525d23304f" providerId="ADAL" clId="{21D76053-4FC2-8046-8E35-708C3EA86774}" dt="2022-08-17T00:34:52.779" v="1" actId="2696"/>
+      <pc:docMkLst>
+        <pc:docMk/>
+      </pc:docMkLst>
+      <pc:sldChg chg="del">
+        <pc:chgData name="Luciano Pereira Soares" userId="16c53e34-c952-423e-8700-c0525d23304f" providerId="ADAL" clId="{21D76053-4FC2-8046-8E35-708C3EA86774}" dt="2022-08-17T00:34:52.779" v="1" actId="2696"/>
+        <pc:sldMkLst>
+          <pc:docMk/>
+          <pc:sldMk cId="0" sldId="256"/>
+        </pc:sldMkLst>
+      </pc:sldChg>
+      <pc:sldChg chg="del">
+        <pc:chgData name="Luciano Pereira Soares" userId="16c53e34-c952-423e-8700-c0525d23304f" providerId="ADAL" clId="{21D76053-4FC2-8046-8E35-708C3EA86774}" dt="2022-08-17T00:34:52.779" v="1" actId="2696"/>
+        <pc:sldMkLst>
+          <pc:docMk/>
+          <pc:sldMk cId="0" sldId="276"/>
+        </pc:sldMkLst>
+      </pc:sldChg>
+      <pc:sldChg chg="del">
+        <pc:chgData name="Luciano Pereira Soares" userId="16c53e34-c952-423e-8700-c0525d23304f" providerId="ADAL" clId="{21D76053-4FC2-8046-8E35-708C3EA86774}" dt="2022-08-17T00:34:52.779" v="1" actId="2696"/>
+        <pc:sldMkLst>
+          <pc:docMk/>
+          <pc:sldMk cId="3492238989" sldId="277"/>
+        </pc:sldMkLst>
+      </pc:sldChg>
+      <pc:sldChg chg="del">
+        <pc:chgData name="Luciano Pereira Soares" userId="16c53e34-c952-423e-8700-c0525d23304f" providerId="ADAL" clId="{21D76053-4FC2-8046-8E35-708C3EA86774}" dt="2022-08-17T00:34:52.779" v="1" actId="2696"/>
+        <pc:sldMkLst>
+          <pc:docMk/>
+          <pc:sldMk cId="1551982945" sldId="278"/>
+        </pc:sldMkLst>
+      </pc:sldChg>
+      <pc:sldChg chg="del">
+        <pc:chgData name="Luciano Pereira Soares" userId="16c53e34-c952-423e-8700-c0525d23304f" providerId="ADAL" clId="{21D76053-4FC2-8046-8E35-708C3EA86774}" dt="2022-08-17T00:34:52.779" v="1" actId="2696"/>
+        <pc:sldMkLst>
+          <pc:docMk/>
+          <pc:sldMk cId="1150689142" sldId="279"/>
+        </pc:sldMkLst>
+      </pc:sldChg>
+      <pc:sldChg chg="del">
+        <pc:chgData name="Luciano Pereira Soares" userId="16c53e34-c952-423e-8700-c0525d23304f" providerId="ADAL" clId="{21D76053-4FC2-8046-8E35-708C3EA86774}" dt="2022-08-17T00:34:52.779" v="1" actId="2696"/>
+        <pc:sldMkLst>
+          <pc:docMk/>
+          <pc:sldMk cId="956012993" sldId="280"/>
+        </pc:sldMkLst>
+      </pc:sldChg>
+      <pc:sldChg chg="del">
+        <pc:chgData name="Luciano Pereira Soares" userId="16c53e34-c952-423e-8700-c0525d23304f" providerId="ADAL" clId="{21D76053-4FC2-8046-8E35-708C3EA86774}" dt="2022-08-17T00:34:52.779" v="1" actId="2696"/>
+        <pc:sldMkLst>
+          <pc:docMk/>
+          <pc:sldMk cId="417571930" sldId="281"/>
+        </pc:sldMkLst>
+      </pc:sldChg>
+      <pc:sldChg chg="del">
+        <pc:chgData name="Luciano Pereira Soares" userId="16c53e34-c952-423e-8700-c0525d23304f" providerId="ADAL" clId="{21D76053-4FC2-8046-8E35-708C3EA86774}" dt="2022-08-17T00:34:52.779" v="1" actId="2696"/>
+        <pc:sldMkLst>
+          <pc:docMk/>
+          <pc:sldMk cId="1091742777" sldId="282"/>
+        </pc:sldMkLst>
+      </pc:sldChg>
+      <pc:sldChg chg="del">
+        <pc:chgData name="Luciano Pereira Soares" userId="16c53e34-c952-423e-8700-c0525d23304f" providerId="ADAL" clId="{21D76053-4FC2-8046-8E35-708C3EA86774}" dt="2022-08-17T00:34:52.779" v="1" actId="2696"/>
+        <pc:sldMkLst>
+          <pc:docMk/>
+          <pc:sldMk cId="1554898846" sldId="283"/>
+        </pc:sldMkLst>
+      </pc:sldChg>
+      <pc:sldChg chg="del">
+        <pc:chgData name="Luciano Pereira Soares" userId="16c53e34-c952-423e-8700-c0525d23304f" providerId="ADAL" clId="{21D76053-4FC2-8046-8E35-708C3EA86774}" dt="2022-08-17T00:34:52.779" v="1" actId="2696"/>
+        <pc:sldMkLst>
+          <pc:docMk/>
+          <pc:sldMk cId="1623398612" sldId="284"/>
+        </pc:sldMkLst>
+      </pc:sldChg>
+      <pc:sldChg chg="delSp del mod">
+        <pc:chgData name="Luciano Pereira Soares" userId="16c53e34-c952-423e-8700-c0525d23304f" providerId="ADAL" clId="{21D76053-4FC2-8046-8E35-708C3EA86774}" dt="2022-08-17T00:34:52.779" v="1" actId="2696"/>
+        <pc:sldMkLst>
+          <pc:docMk/>
+          <pc:sldMk cId="3610650140" sldId="285"/>
+        </pc:sldMkLst>
+        <pc:spChg chg="del">
+          <ac:chgData name="Luciano Pereira Soares" userId="16c53e34-c952-423e-8700-c0525d23304f" providerId="ADAL" clId="{21D76053-4FC2-8046-8E35-708C3EA86774}" dt="2022-08-15T21:48:35.069" v="0" actId="478"/>
+          <ac:spMkLst>
+            <pc:docMk/>
+            <pc:sldMk cId="3610650140" sldId="285"/>
+            <ac:spMk id="3" creationId="{92017288-34E3-384C-A876-1B3DB9BB03C6}"/>
+          </ac:spMkLst>
+        </pc:spChg>
+      </pc:sldChg>
+      <pc:sldChg chg="del">
+        <pc:chgData name="Luciano Pereira Soares" userId="16c53e34-c952-423e-8700-c0525d23304f" providerId="ADAL" clId="{21D76053-4FC2-8046-8E35-708C3EA86774}" dt="2022-08-17T00:34:52.779" v="1" actId="2696"/>
+        <pc:sldMkLst>
+          <pc:docMk/>
+          <pc:sldMk cId="1037304665" sldId="286"/>
+        </pc:sldMkLst>
+      </pc:sldChg>
+      <pc:sldChg chg="del">
+        <pc:chgData name="Luciano Pereira Soares" userId="16c53e34-c952-423e-8700-c0525d23304f" providerId="ADAL" clId="{21D76053-4FC2-8046-8E35-708C3EA86774}" dt="2022-08-17T00:34:52.779" v="1" actId="2696"/>
+        <pc:sldMkLst>
+          <pc:docMk/>
+          <pc:sldMk cId="1290008027" sldId="287"/>
+        </pc:sldMkLst>
+      </pc:sldChg>
+      <pc:sldChg chg="del">
+        <pc:chgData name="Luciano Pereira Soares" userId="16c53e34-c952-423e-8700-c0525d23304f" providerId="ADAL" clId="{21D76053-4FC2-8046-8E35-708C3EA86774}" dt="2022-08-17T00:34:52.779" v="1" actId="2696"/>
+        <pc:sldMkLst>
+          <pc:docMk/>
+          <pc:sldMk cId="3583880700" sldId="288"/>
+        </pc:sldMkLst>
+      </pc:sldChg>
+      <pc:sldChg chg="del">
+        <pc:chgData name="Luciano Pereira Soares" userId="16c53e34-c952-423e-8700-c0525d23304f" providerId="ADAL" clId="{21D76053-4FC2-8046-8E35-708C3EA86774}" dt="2022-08-17T00:34:52.779" v="1" actId="2696"/>
+        <pc:sldMkLst>
+          <pc:docMk/>
+          <pc:sldMk cId="2649827963" sldId="289"/>
+        </pc:sldMkLst>
+      </pc:sldChg>
+      <pc:sldChg chg="del">
+        <pc:chgData name="Luciano Pereira Soares" userId="16c53e34-c952-423e-8700-c0525d23304f" providerId="ADAL" clId="{21D76053-4FC2-8046-8E35-708C3EA86774}" dt="2022-08-17T00:34:52.779" v="1" actId="2696"/>
+        <pc:sldMkLst>
+          <pc:docMk/>
+          <pc:sldMk cId="141332155" sldId="290"/>
+        </pc:sldMkLst>
+      </pc:sldChg>
+      <pc:sldChg chg="del">
+        <pc:chgData name="Luciano Pereira Soares" userId="16c53e34-c952-423e-8700-c0525d23304f" providerId="ADAL" clId="{21D76053-4FC2-8046-8E35-708C3EA86774}" dt="2022-08-17T00:34:52.779" v="1" actId="2696"/>
+        <pc:sldMkLst>
+          <pc:docMk/>
+          <pc:sldMk cId="180960086" sldId="291"/>
+        </pc:sldMkLst>
+      </pc:sldChg>
+      <pc:sldChg chg="del">
+        <pc:chgData name="Luciano Pereira Soares" userId="16c53e34-c952-423e-8700-c0525d23304f" providerId="ADAL" clId="{21D76053-4FC2-8046-8E35-708C3EA86774}" dt="2022-08-17T00:34:52.779" v="1" actId="2696"/>
+        <pc:sldMkLst>
+          <pc:docMk/>
+          <pc:sldMk cId="1134358883" sldId="292"/>
+        </pc:sldMkLst>
+      </pc:sldChg>
+      <pc:sldChg chg="del">
+        <pc:chgData name="Luciano Pereira Soares" userId="16c53e34-c952-423e-8700-c0525d23304f" providerId="ADAL" clId="{21D76053-4FC2-8046-8E35-708C3EA86774}" dt="2022-08-17T00:34:52.779" v="1" actId="2696"/>
+        <pc:sldMkLst>
+          <pc:docMk/>
+          <pc:sldMk cId="4118138588" sldId="293"/>
+        </pc:sldMkLst>
+      </pc:sldChg>
+      <pc:sldChg chg="del">
+        <pc:chgData name="Luciano Pereira Soares" userId="16c53e34-c952-423e-8700-c0525d23304f" providerId="ADAL" clId="{21D76053-4FC2-8046-8E35-708C3EA86774}" dt="2022-08-17T00:34:52.779" v="1" actId="2696"/>
+        <pc:sldMkLst>
+          <pc:docMk/>
+          <pc:sldMk cId="388771689" sldId="294"/>
+        </pc:sldMkLst>
+      </pc:sldChg>
+      <pc:sldChg chg="del">
+        <pc:chgData name="Luciano Pereira Soares" userId="16c53e34-c952-423e-8700-c0525d23304f" providerId="ADAL" clId="{21D76053-4FC2-8046-8E35-708C3EA86774}" dt="2022-08-17T00:34:52.779" v="1" actId="2696"/>
+        <pc:sldMkLst>
+          <pc:docMk/>
+          <pc:sldMk cId="3626902687" sldId="295"/>
+        </pc:sldMkLst>
+      </pc:sldChg>
+      <pc:sldChg chg="del">
+        <pc:chgData name="Luciano Pereira Soares" userId="16c53e34-c952-423e-8700-c0525d23304f" providerId="ADAL" clId="{21D76053-4FC2-8046-8E35-708C3EA86774}" dt="2022-08-17T00:34:52.779" v="1" actId="2696"/>
+        <pc:sldMkLst>
+          <pc:docMk/>
+          <pc:sldMk cId="2084337191" sldId="296"/>
+        </pc:sldMkLst>
+      </pc:sldChg>
+      <pc:sldChg chg="del">
+        <pc:chgData name="Luciano Pereira Soares" userId="16c53e34-c952-423e-8700-c0525d23304f" providerId="ADAL" clId="{21D76053-4FC2-8046-8E35-708C3EA86774}" dt="2022-08-17T00:34:52.779" v="1" actId="2696"/>
+        <pc:sldMkLst>
+          <pc:docMk/>
+          <pc:sldMk cId="1073595821" sldId="297"/>
+        </pc:sldMkLst>
+      </pc:sldChg>
+      <pc:sldChg chg="del">
+        <pc:chgData name="Luciano Pereira Soares" userId="16c53e34-c952-423e-8700-c0525d23304f" providerId="ADAL" clId="{21D76053-4FC2-8046-8E35-708C3EA86774}" dt="2022-08-17T00:34:52.779" v="1" actId="2696"/>
+        <pc:sldMkLst>
+          <pc:docMk/>
+          <pc:sldMk cId="2045755376" sldId="298"/>
+        </pc:sldMkLst>
+      </pc:sldChg>
+      <pc:sldChg chg="del">
+        <pc:chgData name="Luciano Pereira Soares" userId="16c53e34-c952-423e-8700-c0525d23304f" providerId="ADAL" clId="{21D76053-4FC2-8046-8E35-708C3EA86774}" dt="2022-08-17T00:34:52.779" v="1" actId="2696"/>
+        <pc:sldMkLst>
+          <pc:docMk/>
+          <pc:sldMk cId="1374221417" sldId="299"/>
+        </pc:sldMkLst>
+      </pc:sldChg>
+      <pc:sldChg chg="del">
+        <pc:chgData name="Luciano Pereira Soares" userId="16c53e34-c952-423e-8700-c0525d23304f" providerId="ADAL" clId="{21D76053-4FC2-8046-8E35-708C3EA86774}" dt="2022-08-17T00:34:52.779" v="1" actId="2696"/>
+        <pc:sldMkLst>
+          <pc:docMk/>
+          <pc:sldMk cId="3034044073" sldId="300"/>
+        </pc:sldMkLst>
+      </pc:sldChg>
+      <pc:sldChg chg="del">
+        <pc:chgData name="Luciano Pereira Soares" userId="16c53e34-c952-423e-8700-c0525d23304f" providerId="ADAL" clId="{21D76053-4FC2-8046-8E35-708C3EA86774}" dt="2022-08-17T00:34:52.779" v="1" actId="2696"/>
+        <pc:sldMkLst>
+          <pc:docMk/>
+          <pc:sldMk cId="3269634474" sldId="301"/>
+        </pc:sldMkLst>
+      </pc:sldChg>
+      <pc:sldChg chg="del">
+        <pc:chgData name="Luciano Pereira Soares" userId="16c53e34-c952-423e-8700-c0525d23304f" providerId="ADAL" clId="{21D76053-4FC2-8046-8E35-708C3EA86774}" dt="2022-08-17T00:34:52.779" v="1" actId="2696"/>
+        <pc:sldMkLst>
+          <pc:docMk/>
+          <pc:sldMk cId="1573913687" sldId="302"/>
+        </pc:sldMkLst>
+      </pc:sldChg>
+      <pc:sldChg chg="del">
+        <pc:chgData name="Luciano Pereira Soares" userId="16c53e34-c952-423e-8700-c0525d23304f" providerId="ADAL" clId="{21D76053-4FC2-8046-8E35-708C3EA86774}" dt="2022-08-17T00:34:52.779" v="1" actId="2696"/>
+        <pc:sldMkLst>
+          <pc:docMk/>
+          <pc:sldMk cId="2727212897" sldId="303"/>
+        </pc:sldMkLst>
+      </pc:sldChg>
+      <pc:sldChg chg="del">
+        <pc:chgData name="Luciano Pereira Soares" userId="16c53e34-c952-423e-8700-c0525d23304f" providerId="ADAL" clId="{21D76053-4FC2-8046-8E35-708C3EA86774}" dt="2022-08-17T00:34:52.779" v="1" actId="2696"/>
+        <pc:sldMkLst>
+          <pc:docMk/>
+          <pc:sldMk cId="3251471121" sldId="304"/>
+        </pc:sldMkLst>
+      </pc:sldChg>
+      <pc:sldChg chg="del">
+        <pc:chgData name="Luciano Pereira Soares" userId="16c53e34-c952-423e-8700-c0525d23304f" providerId="ADAL" clId="{21D76053-4FC2-8046-8E35-708C3EA86774}" dt="2022-08-17T00:34:52.779" v="1" actId="2696"/>
+        <pc:sldMkLst>
+          <pc:docMk/>
+          <pc:sldMk cId="453157801" sldId="305"/>
+        </pc:sldMkLst>
+      </pc:sldChg>
+      <pc:sldChg chg="del">
+        <pc:chgData name="Luciano Pereira Soares" userId="16c53e34-c952-423e-8700-c0525d23304f" providerId="ADAL" clId="{21D76053-4FC2-8046-8E35-708C3EA86774}" dt="2022-08-17T00:34:52.779" v="1" actId="2696"/>
+        <pc:sldMkLst>
+          <pc:docMk/>
+          <pc:sldMk cId="1951566873" sldId="306"/>
+        </pc:sldMkLst>
+      </pc:sldChg>
+      <pc:sldChg chg="del">
+        <pc:chgData name="Luciano Pereira Soares" userId="16c53e34-c952-423e-8700-c0525d23304f" providerId="ADAL" clId="{21D76053-4FC2-8046-8E35-708C3EA86774}" dt="2022-08-17T00:34:52.779" v="1" actId="2696"/>
+        <pc:sldMkLst>
+          <pc:docMk/>
+          <pc:sldMk cId="3878185438" sldId="307"/>
+        </pc:sldMkLst>
+      </pc:sldChg>
+      <pc:sldChg chg="del">
+        <pc:chgData name="Luciano Pereira Soares" userId="16c53e34-c952-423e-8700-c0525d23304f" providerId="ADAL" clId="{21D76053-4FC2-8046-8E35-708C3EA86774}" dt="2022-08-17T00:34:52.779" v="1" actId="2696"/>
+        <pc:sldMkLst>
+          <pc:docMk/>
+          <pc:sldMk cId="3833048560" sldId="308"/>
+        </pc:sldMkLst>
+      </pc:sldChg>
+      <pc:sldChg chg="del">
+        <pc:chgData name="Luciano Pereira Soares" userId="16c53e34-c952-423e-8700-c0525d23304f" providerId="ADAL" clId="{21D76053-4FC2-8046-8E35-708C3EA86774}" dt="2022-08-17T00:34:52.779" v="1" actId="2696"/>
+        <pc:sldMkLst>
+          <pc:docMk/>
+          <pc:sldMk cId="4192908236" sldId="309"/>
+        </pc:sldMkLst>
+      </pc:sldChg>
+      <pc:sldChg chg="del">
+        <pc:chgData name="Luciano Pereira Soares" userId="16c53e34-c952-423e-8700-c0525d23304f" providerId="ADAL" clId="{21D76053-4FC2-8046-8E35-708C3EA86774}" dt="2022-08-17T00:34:52.779" v="1" actId="2696"/>
+        <pc:sldMkLst>
+          <pc:docMk/>
+          <pc:sldMk cId="2450581019" sldId="311"/>
+        </pc:sldMkLst>
+      </pc:sldChg>
+      <pc:sldChg chg="del">
+        <pc:chgData name="Luciano Pereira Soares" userId="16c53e34-c952-423e-8700-c0525d23304f" providerId="ADAL" clId="{21D76053-4FC2-8046-8E35-708C3EA86774}" dt="2022-08-17T00:34:52.779" v="1" actId="2696"/>
+        <pc:sldMkLst>
+          <pc:docMk/>
+          <pc:sldMk cId="2608316626" sldId="312"/>
+        </pc:sldMkLst>
+      </pc:sldChg>
+      <pc:sldChg chg="del">
+        <pc:chgData name="Luciano Pereira Soares" userId="16c53e34-c952-423e-8700-c0525d23304f" providerId="ADAL" clId="{21D76053-4FC2-8046-8E35-708C3EA86774}" dt="2022-08-17T00:34:52.779" v="1" actId="2696"/>
+        <pc:sldMkLst>
+          <pc:docMk/>
+          <pc:sldMk cId="1934957580" sldId="313"/>
+        </pc:sldMkLst>
+      </pc:sldChg>
+      <pc:sldChg chg="del">
+        <pc:chgData name="Luciano Pereira Soares" userId="16c53e34-c952-423e-8700-c0525d23304f" providerId="ADAL" clId="{21D76053-4FC2-8046-8E35-708C3EA86774}" dt="2022-08-17T00:34:52.779" v="1" actId="2696"/>
+        <pc:sldMkLst>
+          <pc:docMk/>
+          <pc:sldMk cId="2807832657" sldId="314"/>
+        </pc:sldMkLst>
+      </pc:sldChg>
+      <pc:sldChg chg="del">
+        <pc:chgData name="Luciano Pereira Soares" userId="16c53e34-c952-423e-8700-c0525d23304f" providerId="ADAL" clId="{21D76053-4FC2-8046-8E35-708C3EA86774}" dt="2022-08-17T00:34:52.779" v="1" actId="2696"/>
+        <pc:sldMkLst>
+          <pc:docMk/>
+          <pc:sldMk cId="1028870872" sldId="315"/>
+        </pc:sldMkLst>
+      </pc:sldChg>
+      <pc:sldChg chg="del">
+        <pc:chgData name="Luciano Pereira Soares" userId="16c53e34-c952-423e-8700-c0525d23304f" providerId="ADAL" clId="{21D76053-4FC2-8046-8E35-708C3EA86774}" dt="2022-08-17T00:34:52.779" v="1" actId="2696"/>
+        <pc:sldMkLst>
+          <pc:docMk/>
+          <pc:sldMk cId="1189783527" sldId="316"/>
+        </pc:sldMkLst>
+      </pc:sldChg>
+      <pc:sldChg chg="del">
+        <pc:chgData name="Luciano Pereira Soares" userId="16c53e34-c952-423e-8700-c0525d23304f" providerId="ADAL" clId="{21D76053-4FC2-8046-8E35-708C3EA86774}" dt="2022-08-17T00:34:52.779" v="1" actId="2696"/>
+        <pc:sldMkLst>
+          <pc:docMk/>
+          <pc:sldMk cId="1798049986" sldId="317"/>
+        </pc:sldMkLst>
+      </pc:sldChg>
+      <pc:sldChg chg="del">
+        <pc:chgData name="Luciano Pereira Soares" userId="16c53e34-c952-423e-8700-c0525d23304f" providerId="ADAL" clId="{21D76053-4FC2-8046-8E35-708C3EA86774}" dt="2022-08-17T00:34:52.779" v="1" actId="2696"/>
+        <pc:sldMkLst>
+          <pc:docMk/>
+          <pc:sldMk cId="1347503315" sldId="318"/>
+        </pc:sldMkLst>
+      </pc:sldChg>
+      <pc:sldChg chg="del">
+        <pc:chgData name="Luciano Pereira Soares" userId="16c53e34-c952-423e-8700-c0525d23304f" providerId="ADAL" clId="{21D76053-4FC2-8046-8E35-708C3EA86774}" dt="2022-08-17T00:34:52.779" v="1" actId="2696"/>
+        <pc:sldMkLst>
+          <pc:docMk/>
+          <pc:sldMk cId="1648801762" sldId="319"/>
+        </pc:sldMkLst>
+      </pc:sldChg>
+      <pc:sldChg chg="del">
+        <pc:chgData name="Luciano Pereira Soares" userId="16c53e34-c952-423e-8700-c0525d23304f" providerId="ADAL" clId="{21D76053-4FC2-8046-8E35-708C3EA86774}" dt="2022-08-17T00:34:52.779" v="1" actId="2696"/>
+        <pc:sldMkLst>
+          <pc:docMk/>
+          <pc:sldMk cId="3080152500" sldId="320"/>
+        </pc:sldMkLst>
+      </pc:sldChg>
+      <pc:sldChg chg="del">
+        <pc:chgData name="Luciano Pereira Soares" userId="16c53e34-c952-423e-8700-c0525d23304f" providerId="ADAL" clId="{21D76053-4FC2-8046-8E35-708C3EA86774}" dt="2022-08-17T00:34:52.779" v="1" actId="2696"/>
+        <pc:sldMkLst>
+          <pc:docMk/>
+          <pc:sldMk cId="1861366562" sldId="321"/>
+        </pc:sldMkLst>
+      </pc:sldChg>
+      <pc:sldChg chg="del">
+        <pc:chgData name="Luciano Pereira Soares" userId="16c53e34-c952-423e-8700-c0525d23304f" providerId="ADAL" clId="{21D76053-4FC2-8046-8E35-708C3EA86774}" dt="2022-08-17T00:34:52.779" v="1" actId="2696"/>
+        <pc:sldMkLst>
+          <pc:docMk/>
+          <pc:sldMk cId="380794106" sldId="322"/>
+        </pc:sldMkLst>
+      </pc:sldChg>
+      <pc:sldChg chg="del">
+        <pc:chgData name="Luciano Pereira Soares" userId="16c53e34-c952-423e-8700-c0525d23304f" providerId="ADAL" clId="{21D76053-4FC2-8046-8E35-708C3EA86774}" dt="2022-08-17T00:34:52.779" v="1" actId="2696"/>
+        <pc:sldMkLst>
+          <pc:docMk/>
+          <pc:sldMk cId="4089055669" sldId="323"/>
+        </pc:sldMkLst>
+      </pc:sldChg>
+      <pc:sldChg chg="del">
+        <pc:chgData name="Luciano Pereira Soares" userId="16c53e34-c952-423e-8700-c0525d23304f" providerId="ADAL" clId="{21D76053-4FC2-8046-8E35-708C3EA86774}" dt="2022-08-17T00:34:52.779" v="1" actId="2696"/>
+        <pc:sldMkLst>
+          <pc:docMk/>
+          <pc:sldMk cId="1832844973" sldId="324"/>
+        </pc:sldMkLst>
+      </pc:sldChg>
+      <pc:sldChg chg="del">
+        <pc:chgData name="Luciano Pereira Soares" userId="16c53e34-c952-423e-8700-c0525d23304f" providerId="ADAL" clId="{21D76053-4FC2-8046-8E35-708C3EA86774}" dt="2022-08-17T00:34:52.779" v="1" actId="2696"/>
+        <pc:sldMkLst>
+          <pc:docMk/>
+          <pc:sldMk cId="157196928" sldId="325"/>
+        </pc:sldMkLst>
+      </pc:sldChg>
+      <pc:sldChg chg="del">
+        <pc:chgData name="Luciano Pereira Soares" userId="16c53e34-c952-423e-8700-c0525d23304f" providerId="ADAL" clId="{21D76053-4FC2-8046-8E35-708C3EA86774}" dt="2022-08-17T00:34:52.779" v="1" actId="2696"/>
+        <pc:sldMkLst>
+          <pc:docMk/>
+          <pc:sldMk cId="1637131583" sldId="326"/>
+        </pc:sldMkLst>
+      </pc:sldChg>
+      <pc:sldChg chg="del">
+        <pc:chgData name="Luciano Pereira Soares" userId="16c53e34-c952-423e-8700-c0525d23304f" providerId="ADAL" clId="{21D76053-4FC2-8046-8E35-708C3EA86774}" dt="2022-08-17T00:34:52.779" v="1" actId="2696"/>
+        <pc:sldMkLst>
+          <pc:docMk/>
+          <pc:sldMk cId="3380530401" sldId="327"/>
+        </pc:sldMkLst>
+      </pc:sldChg>
+      <pc:sldChg chg="del">
+        <pc:chgData name="Luciano Pereira Soares" userId="16c53e34-c952-423e-8700-c0525d23304f" providerId="ADAL" clId="{21D76053-4FC2-8046-8E35-708C3EA86774}" dt="2022-08-17T00:34:52.779" v="1" actId="2696"/>
+        <pc:sldMkLst>
+          <pc:docMk/>
+          <pc:sldMk cId="65727687" sldId="328"/>
+        </pc:sldMkLst>
+      </pc:sldChg>
+      <pc:sldChg chg="del">
+        <pc:chgData name="Luciano Pereira Soares" userId="16c53e34-c952-423e-8700-c0525d23304f" providerId="ADAL" clId="{21D76053-4FC2-8046-8E35-708C3EA86774}" dt="2022-08-17T00:34:52.779" v="1" actId="2696"/>
+        <pc:sldMkLst>
+          <pc:docMk/>
+          <pc:sldMk cId="339457961" sldId="329"/>
+        </pc:sldMkLst>
+      </pc:sldChg>
+      <pc:sldChg chg="del">
+        <pc:chgData name="Luciano Pereira Soares" userId="16c53e34-c952-423e-8700-c0525d23304f" providerId="ADAL" clId="{21D76053-4FC2-8046-8E35-708C3EA86774}" dt="2022-08-17T00:34:52.779" v="1" actId="2696"/>
+        <pc:sldMkLst>
+          <pc:docMk/>
+          <pc:sldMk cId="520571115" sldId="330"/>
+        </pc:sldMkLst>
+      </pc:sldChg>
+      <pc:sldChg chg="del">
+        <pc:chgData name="Luciano Pereira Soares" userId="16c53e34-c952-423e-8700-c0525d23304f" providerId="ADAL" clId="{21D76053-4FC2-8046-8E35-708C3EA86774}" dt="2022-08-17T00:34:52.779" v="1" actId="2696"/>
+        <pc:sldMkLst>
+          <pc:docMk/>
+          <pc:sldMk cId="2164295974" sldId="331"/>
+        </pc:sldMkLst>
+      </pc:sldChg>
+      <pc:sldChg chg="del">
+        <pc:chgData name="Luciano Pereira Soares" userId="16c53e34-c952-423e-8700-c0525d23304f" providerId="ADAL" clId="{21D76053-4FC2-8046-8E35-708C3EA86774}" dt="2022-08-17T00:34:52.779" v="1" actId="2696"/>
+        <pc:sldMkLst>
+          <pc:docMk/>
+          <pc:sldMk cId="771695050" sldId="332"/>
+        </pc:sldMkLst>
+      </pc:sldChg>
+      <pc:sldChg chg="del">
+        <pc:chgData name="Luciano Pereira Soares" userId="16c53e34-c952-423e-8700-c0525d23304f" providerId="ADAL" clId="{21D76053-4FC2-8046-8E35-708C3EA86774}" dt="2022-08-17T00:34:52.779" v="1" actId="2696"/>
+        <pc:sldMkLst>
+          <pc:docMk/>
+          <pc:sldMk cId="3585071933" sldId="333"/>
+        </pc:sldMkLst>
+      </pc:sldChg>
+      <pc:sldChg chg="del">
+        <pc:chgData name="Luciano Pereira Soares" userId="16c53e34-c952-423e-8700-c0525d23304f" providerId="ADAL" clId="{21D76053-4FC2-8046-8E35-708C3EA86774}" dt="2022-08-17T00:34:52.779" v="1" actId="2696"/>
+        <pc:sldMkLst>
+          <pc:docMk/>
+          <pc:sldMk cId="1416409760" sldId="334"/>
+        </pc:sldMkLst>
+      </pc:sldChg>
+      <pc:sldChg chg="del">
+        <pc:chgData name="Luciano Pereira Soares" userId="16c53e34-c952-423e-8700-c0525d23304f" providerId="ADAL" clId="{21D76053-4FC2-8046-8E35-708C3EA86774}" dt="2022-08-17T00:34:52.779" v="1" actId="2696"/>
+        <pc:sldMkLst>
+          <pc:docMk/>
+          <pc:sldMk cId="2257655667" sldId="335"/>
+        </pc:sldMkLst>
+      </pc:sldChg>
+      <pc:sldChg chg="del">
+        <pc:chgData name="Luciano Pereira Soares" userId="16c53e34-c952-423e-8700-c0525d23304f" providerId="ADAL" clId="{21D76053-4FC2-8046-8E35-708C3EA86774}" dt="2022-08-17T00:34:52.779" v="1" actId="2696"/>
+        <pc:sldMkLst>
+          <pc:docMk/>
+          <pc:sldMk cId="3672068477" sldId="336"/>
+        </pc:sldMkLst>
+      </pc:sldChg>
+      <pc:sldChg chg="del">
+        <pc:chgData name="Luciano Pereira Soares" userId="16c53e34-c952-423e-8700-c0525d23304f" providerId="ADAL" clId="{21D76053-4FC2-8046-8E35-708C3EA86774}" dt="2022-08-17T00:34:52.779" v="1" actId="2696"/>
+        <pc:sldMkLst>
+          <pc:docMk/>
+          <pc:sldMk cId="2246476944" sldId="337"/>
+        </pc:sldMkLst>
+      </pc:sldChg>
+      <pc:sldChg chg="del">
+        <pc:chgData name="Luciano Pereira Soares" userId="16c53e34-c952-423e-8700-c0525d23304f" providerId="ADAL" clId="{21D76053-4FC2-8046-8E35-708C3EA86774}" dt="2022-08-17T00:34:52.779" v="1" actId="2696"/>
+        <pc:sldMkLst>
+          <pc:docMk/>
+          <pc:sldMk cId="96632061" sldId="356"/>
+        </pc:sldMkLst>
+      </pc:sldChg>
+      <pc:sldChg chg="del">
+        <pc:chgData name="Luciano Pereira Soares" userId="16c53e34-c952-423e-8700-c0525d23304f" providerId="ADAL" clId="{21D76053-4FC2-8046-8E35-708C3EA86774}" dt="2022-08-17T00:34:52.779" v="1" actId="2696"/>
+        <pc:sldMkLst>
+          <pc:docMk/>
+          <pc:sldMk cId="810874321" sldId="357"/>
+        </pc:sldMkLst>
+      </pc:sldChg>
+      <pc:sldChg chg="del">
+        <pc:chgData name="Luciano Pereira Soares" userId="16c53e34-c952-423e-8700-c0525d23304f" providerId="ADAL" clId="{21D76053-4FC2-8046-8E35-708C3EA86774}" dt="2022-08-17T00:34:52.779" v="1" actId="2696"/>
+        <pc:sldMkLst>
+          <pc:docMk/>
+          <pc:sldMk cId="372318287" sldId="554"/>
+        </pc:sldMkLst>
+      </pc:sldChg>
+      <pc:sldChg chg="del">
+        <pc:chgData name="Luciano Pereira Soares" userId="16c53e34-c952-423e-8700-c0525d23304f" providerId="ADAL" clId="{21D76053-4FC2-8046-8E35-708C3EA86774}" dt="2022-08-17T00:34:52.779" v="1" actId="2696"/>
+        <pc:sldMkLst>
+          <pc:docMk/>
+          <pc:sldMk cId="3155441199" sldId="555"/>
+        </pc:sldMkLst>
+      </pc:sldChg>
+    </pc:docChg>
+  </pc:docChgLst>
+  <pc:docChgLst>
     <pc:chgData name="Luciano Pereira Soares" userId="16c53e34-c952-423e-8700-c0525d23304f" providerId="ADAL" clId="{8C2C768A-E874-4546-8752-68ED258256F4}"/>
     <pc:docChg chg="delSld modSld delSection modSection">
       <pc:chgData name="Luciano Pereira Soares" userId="16c53e34-c952-423e-8700-c0525d23304f" providerId="ADAL" clId="{8C2C768A-E874-4546-8752-68ED258256F4}" dt="2022-08-29T23:25:16.506" v="3" actId="948"/>
@@ -1659,485 +2138,6 @@
         <pc:sldMkLst>
           <pc:docMk/>
           <pc:sldMk cId="2720856063" sldId="561"/>
-        </pc:sldMkLst>
-      </pc:sldChg>
-    </pc:docChg>
-  </pc:docChgLst>
-  <pc:docChgLst>
-    <pc:chgData name="Luciano Pereira Soares" userId="16c53e34-c952-423e-8700-c0525d23304f" providerId="ADAL" clId="{21D76053-4FC2-8046-8E35-708C3EA86774}"/>
-    <pc:docChg chg="custSel delSld modSld modSection">
-      <pc:chgData name="Luciano Pereira Soares" userId="16c53e34-c952-423e-8700-c0525d23304f" providerId="ADAL" clId="{21D76053-4FC2-8046-8E35-708C3EA86774}" dt="2022-08-17T00:34:52.779" v="1" actId="2696"/>
-      <pc:docMkLst>
-        <pc:docMk/>
-      </pc:docMkLst>
-      <pc:sldChg chg="del">
-        <pc:chgData name="Luciano Pereira Soares" userId="16c53e34-c952-423e-8700-c0525d23304f" providerId="ADAL" clId="{21D76053-4FC2-8046-8E35-708C3EA86774}" dt="2022-08-17T00:34:52.779" v="1" actId="2696"/>
-        <pc:sldMkLst>
-          <pc:docMk/>
-          <pc:sldMk cId="0" sldId="256"/>
-        </pc:sldMkLst>
-      </pc:sldChg>
-      <pc:sldChg chg="del">
-        <pc:chgData name="Luciano Pereira Soares" userId="16c53e34-c952-423e-8700-c0525d23304f" providerId="ADAL" clId="{21D76053-4FC2-8046-8E35-708C3EA86774}" dt="2022-08-17T00:34:52.779" v="1" actId="2696"/>
-        <pc:sldMkLst>
-          <pc:docMk/>
-          <pc:sldMk cId="0" sldId="276"/>
-        </pc:sldMkLst>
-      </pc:sldChg>
-      <pc:sldChg chg="del">
-        <pc:chgData name="Luciano Pereira Soares" userId="16c53e34-c952-423e-8700-c0525d23304f" providerId="ADAL" clId="{21D76053-4FC2-8046-8E35-708C3EA86774}" dt="2022-08-17T00:34:52.779" v="1" actId="2696"/>
-        <pc:sldMkLst>
-          <pc:docMk/>
-          <pc:sldMk cId="3492238989" sldId="277"/>
-        </pc:sldMkLst>
-      </pc:sldChg>
-      <pc:sldChg chg="del">
-        <pc:chgData name="Luciano Pereira Soares" userId="16c53e34-c952-423e-8700-c0525d23304f" providerId="ADAL" clId="{21D76053-4FC2-8046-8E35-708C3EA86774}" dt="2022-08-17T00:34:52.779" v="1" actId="2696"/>
-        <pc:sldMkLst>
-          <pc:docMk/>
-          <pc:sldMk cId="1551982945" sldId="278"/>
-        </pc:sldMkLst>
-      </pc:sldChg>
-      <pc:sldChg chg="del">
-        <pc:chgData name="Luciano Pereira Soares" userId="16c53e34-c952-423e-8700-c0525d23304f" providerId="ADAL" clId="{21D76053-4FC2-8046-8E35-708C3EA86774}" dt="2022-08-17T00:34:52.779" v="1" actId="2696"/>
-        <pc:sldMkLst>
-          <pc:docMk/>
-          <pc:sldMk cId="1150689142" sldId="279"/>
-        </pc:sldMkLst>
-      </pc:sldChg>
-      <pc:sldChg chg="del">
-        <pc:chgData name="Luciano Pereira Soares" userId="16c53e34-c952-423e-8700-c0525d23304f" providerId="ADAL" clId="{21D76053-4FC2-8046-8E35-708C3EA86774}" dt="2022-08-17T00:34:52.779" v="1" actId="2696"/>
-        <pc:sldMkLst>
-          <pc:docMk/>
-          <pc:sldMk cId="956012993" sldId="280"/>
-        </pc:sldMkLst>
-      </pc:sldChg>
-      <pc:sldChg chg="del">
-        <pc:chgData name="Luciano Pereira Soares" userId="16c53e34-c952-423e-8700-c0525d23304f" providerId="ADAL" clId="{21D76053-4FC2-8046-8E35-708C3EA86774}" dt="2022-08-17T00:34:52.779" v="1" actId="2696"/>
-        <pc:sldMkLst>
-          <pc:docMk/>
-          <pc:sldMk cId="417571930" sldId="281"/>
-        </pc:sldMkLst>
-      </pc:sldChg>
-      <pc:sldChg chg="del">
-        <pc:chgData name="Luciano Pereira Soares" userId="16c53e34-c952-423e-8700-c0525d23304f" providerId="ADAL" clId="{21D76053-4FC2-8046-8E35-708C3EA86774}" dt="2022-08-17T00:34:52.779" v="1" actId="2696"/>
-        <pc:sldMkLst>
-          <pc:docMk/>
-          <pc:sldMk cId="1091742777" sldId="282"/>
-        </pc:sldMkLst>
-      </pc:sldChg>
-      <pc:sldChg chg="del">
-        <pc:chgData name="Luciano Pereira Soares" userId="16c53e34-c952-423e-8700-c0525d23304f" providerId="ADAL" clId="{21D76053-4FC2-8046-8E35-708C3EA86774}" dt="2022-08-17T00:34:52.779" v="1" actId="2696"/>
-        <pc:sldMkLst>
-          <pc:docMk/>
-          <pc:sldMk cId="1554898846" sldId="283"/>
-        </pc:sldMkLst>
-      </pc:sldChg>
-      <pc:sldChg chg="del">
-        <pc:chgData name="Luciano Pereira Soares" userId="16c53e34-c952-423e-8700-c0525d23304f" providerId="ADAL" clId="{21D76053-4FC2-8046-8E35-708C3EA86774}" dt="2022-08-17T00:34:52.779" v="1" actId="2696"/>
-        <pc:sldMkLst>
-          <pc:docMk/>
-          <pc:sldMk cId="1623398612" sldId="284"/>
-        </pc:sldMkLst>
-      </pc:sldChg>
-      <pc:sldChg chg="delSp del mod">
-        <pc:chgData name="Luciano Pereira Soares" userId="16c53e34-c952-423e-8700-c0525d23304f" providerId="ADAL" clId="{21D76053-4FC2-8046-8E35-708C3EA86774}" dt="2022-08-17T00:34:52.779" v="1" actId="2696"/>
-        <pc:sldMkLst>
-          <pc:docMk/>
-          <pc:sldMk cId="3610650140" sldId="285"/>
-        </pc:sldMkLst>
-        <pc:spChg chg="del">
-          <ac:chgData name="Luciano Pereira Soares" userId="16c53e34-c952-423e-8700-c0525d23304f" providerId="ADAL" clId="{21D76053-4FC2-8046-8E35-708C3EA86774}" dt="2022-08-15T21:48:35.069" v="0" actId="478"/>
-          <ac:spMkLst>
-            <pc:docMk/>
-            <pc:sldMk cId="3610650140" sldId="285"/>
-            <ac:spMk id="3" creationId="{92017288-34E3-384C-A876-1B3DB9BB03C6}"/>
-          </ac:spMkLst>
-        </pc:spChg>
-      </pc:sldChg>
-      <pc:sldChg chg="del">
-        <pc:chgData name="Luciano Pereira Soares" userId="16c53e34-c952-423e-8700-c0525d23304f" providerId="ADAL" clId="{21D76053-4FC2-8046-8E35-708C3EA86774}" dt="2022-08-17T00:34:52.779" v="1" actId="2696"/>
-        <pc:sldMkLst>
-          <pc:docMk/>
-          <pc:sldMk cId="1037304665" sldId="286"/>
-        </pc:sldMkLst>
-      </pc:sldChg>
-      <pc:sldChg chg="del">
-        <pc:chgData name="Luciano Pereira Soares" userId="16c53e34-c952-423e-8700-c0525d23304f" providerId="ADAL" clId="{21D76053-4FC2-8046-8E35-708C3EA86774}" dt="2022-08-17T00:34:52.779" v="1" actId="2696"/>
-        <pc:sldMkLst>
-          <pc:docMk/>
-          <pc:sldMk cId="1290008027" sldId="287"/>
-        </pc:sldMkLst>
-      </pc:sldChg>
-      <pc:sldChg chg="del">
-        <pc:chgData name="Luciano Pereira Soares" userId="16c53e34-c952-423e-8700-c0525d23304f" providerId="ADAL" clId="{21D76053-4FC2-8046-8E35-708C3EA86774}" dt="2022-08-17T00:34:52.779" v="1" actId="2696"/>
-        <pc:sldMkLst>
-          <pc:docMk/>
-          <pc:sldMk cId="3583880700" sldId="288"/>
-        </pc:sldMkLst>
-      </pc:sldChg>
-      <pc:sldChg chg="del">
-        <pc:chgData name="Luciano Pereira Soares" userId="16c53e34-c952-423e-8700-c0525d23304f" providerId="ADAL" clId="{21D76053-4FC2-8046-8E35-708C3EA86774}" dt="2022-08-17T00:34:52.779" v="1" actId="2696"/>
-        <pc:sldMkLst>
-          <pc:docMk/>
-          <pc:sldMk cId="2649827963" sldId="289"/>
-        </pc:sldMkLst>
-      </pc:sldChg>
-      <pc:sldChg chg="del">
-        <pc:chgData name="Luciano Pereira Soares" userId="16c53e34-c952-423e-8700-c0525d23304f" providerId="ADAL" clId="{21D76053-4FC2-8046-8E35-708C3EA86774}" dt="2022-08-17T00:34:52.779" v="1" actId="2696"/>
-        <pc:sldMkLst>
-          <pc:docMk/>
-          <pc:sldMk cId="141332155" sldId="290"/>
-        </pc:sldMkLst>
-      </pc:sldChg>
-      <pc:sldChg chg="del">
-        <pc:chgData name="Luciano Pereira Soares" userId="16c53e34-c952-423e-8700-c0525d23304f" providerId="ADAL" clId="{21D76053-4FC2-8046-8E35-708C3EA86774}" dt="2022-08-17T00:34:52.779" v="1" actId="2696"/>
-        <pc:sldMkLst>
-          <pc:docMk/>
-          <pc:sldMk cId="180960086" sldId="291"/>
-        </pc:sldMkLst>
-      </pc:sldChg>
-      <pc:sldChg chg="del">
-        <pc:chgData name="Luciano Pereira Soares" userId="16c53e34-c952-423e-8700-c0525d23304f" providerId="ADAL" clId="{21D76053-4FC2-8046-8E35-708C3EA86774}" dt="2022-08-17T00:34:52.779" v="1" actId="2696"/>
-        <pc:sldMkLst>
-          <pc:docMk/>
-          <pc:sldMk cId="1134358883" sldId="292"/>
-        </pc:sldMkLst>
-      </pc:sldChg>
-      <pc:sldChg chg="del">
-        <pc:chgData name="Luciano Pereira Soares" userId="16c53e34-c952-423e-8700-c0525d23304f" providerId="ADAL" clId="{21D76053-4FC2-8046-8E35-708C3EA86774}" dt="2022-08-17T00:34:52.779" v="1" actId="2696"/>
-        <pc:sldMkLst>
-          <pc:docMk/>
-          <pc:sldMk cId="4118138588" sldId="293"/>
-        </pc:sldMkLst>
-      </pc:sldChg>
-      <pc:sldChg chg="del">
-        <pc:chgData name="Luciano Pereira Soares" userId="16c53e34-c952-423e-8700-c0525d23304f" providerId="ADAL" clId="{21D76053-4FC2-8046-8E35-708C3EA86774}" dt="2022-08-17T00:34:52.779" v="1" actId="2696"/>
-        <pc:sldMkLst>
-          <pc:docMk/>
-          <pc:sldMk cId="388771689" sldId="294"/>
-        </pc:sldMkLst>
-      </pc:sldChg>
-      <pc:sldChg chg="del">
-        <pc:chgData name="Luciano Pereira Soares" userId="16c53e34-c952-423e-8700-c0525d23304f" providerId="ADAL" clId="{21D76053-4FC2-8046-8E35-708C3EA86774}" dt="2022-08-17T00:34:52.779" v="1" actId="2696"/>
-        <pc:sldMkLst>
-          <pc:docMk/>
-          <pc:sldMk cId="3626902687" sldId="295"/>
-        </pc:sldMkLst>
-      </pc:sldChg>
-      <pc:sldChg chg="del">
-        <pc:chgData name="Luciano Pereira Soares" userId="16c53e34-c952-423e-8700-c0525d23304f" providerId="ADAL" clId="{21D76053-4FC2-8046-8E35-708C3EA86774}" dt="2022-08-17T00:34:52.779" v="1" actId="2696"/>
-        <pc:sldMkLst>
-          <pc:docMk/>
-          <pc:sldMk cId="2084337191" sldId="296"/>
-        </pc:sldMkLst>
-      </pc:sldChg>
-      <pc:sldChg chg="del">
-        <pc:chgData name="Luciano Pereira Soares" userId="16c53e34-c952-423e-8700-c0525d23304f" providerId="ADAL" clId="{21D76053-4FC2-8046-8E35-708C3EA86774}" dt="2022-08-17T00:34:52.779" v="1" actId="2696"/>
-        <pc:sldMkLst>
-          <pc:docMk/>
-          <pc:sldMk cId="1073595821" sldId="297"/>
-        </pc:sldMkLst>
-      </pc:sldChg>
-      <pc:sldChg chg="del">
-        <pc:chgData name="Luciano Pereira Soares" userId="16c53e34-c952-423e-8700-c0525d23304f" providerId="ADAL" clId="{21D76053-4FC2-8046-8E35-708C3EA86774}" dt="2022-08-17T00:34:52.779" v="1" actId="2696"/>
-        <pc:sldMkLst>
-          <pc:docMk/>
-          <pc:sldMk cId="2045755376" sldId="298"/>
-        </pc:sldMkLst>
-      </pc:sldChg>
-      <pc:sldChg chg="del">
-        <pc:chgData name="Luciano Pereira Soares" userId="16c53e34-c952-423e-8700-c0525d23304f" providerId="ADAL" clId="{21D76053-4FC2-8046-8E35-708C3EA86774}" dt="2022-08-17T00:34:52.779" v="1" actId="2696"/>
-        <pc:sldMkLst>
-          <pc:docMk/>
-          <pc:sldMk cId="1374221417" sldId="299"/>
-        </pc:sldMkLst>
-      </pc:sldChg>
-      <pc:sldChg chg="del">
-        <pc:chgData name="Luciano Pereira Soares" userId="16c53e34-c952-423e-8700-c0525d23304f" providerId="ADAL" clId="{21D76053-4FC2-8046-8E35-708C3EA86774}" dt="2022-08-17T00:34:52.779" v="1" actId="2696"/>
-        <pc:sldMkLst>
-          <pc:docMk/>
-          <pc:sldMk cId="3034044073" sldId="300"/>
-        </pc:sldMkLst>
-      </pc:sldChg>
-      <pc:sldChg chg="del">
-        <pc:chgData name="Luciano Pereira Soares" userId="16c53e34-c952-423e-8700-c0525d23304f" providerId="ADAL" clId="{21D76053-4FC2-8046-8E35-708C3EA86774}" dt="2022-08-17T00:34:52.779" v="1" actId="2696"/>
-        <pc:sldMkLst>
-          <pc:docMk/>
-          <pc:sldMk cId="3269634474" sldId="301"/>
-        </pc:sldMkLst>
-      </pc:sldChg>
-      <pc:sldChg chg="del">
-        <pc:chgData name="Luciano Pereira Soares" userId="16c53e34-c952-423e-8700-c0525d23304f" providerId="ADAL" clId="{21D76053-4FC2-8046-8E35-708C3EA86774}" dt="2022-08-17T00:34:52.779" v="1" actId="2696"/>
-        <pc:sldMkLst>
-          <pc:docMk/>
-          <pc:sldMk cId="1573913687" sldId="302"/>
-        </pc:sldMkLst>
-      </pc:sldChg>
-      <pc:sldChg chg="del">
-        <pc:chgData name="Luciano Pereira Soares" userId="16c53e34-c952-423e-8700-c0525d23304f" providerId="ADAL" clId="{21D76053-4FC2-8046-8E35-708C3EA86774}" dt="2022-08-17T00:34:52.779" v="1" actId="2696"/>
-        <pc:sldMkLst>
-          <pc:docMk/>
-          <pc:sldMk cId="2727212897" sldId="303"/>
-        </pc:sldMkLst>
-      </pc:sldChg>
-      <pc:sldChg chg="del">
-        <pc:chgData name="Luciano Pereira Soares" userId="16c53e34-c952-423e-8700-c0525d23304f" providerId="ADAL" clId="{21D76053-4FC2-8046-8E35-708C3EA86774}" dt="2022-08-17T00:34:52.779" v="1" actId="2696"/>
-        <pc:sldMkLst>
-          <pc:docMk/>
-          <pc:sldMk cId="3251471121" sldId="304"/>
-        </pc:sldMkLst>
-      </pc:sldChg>
-      <pc:sldChg chg="del">
-        <pc:chgData name="Luciano Pereira Soares" userId="16c53e34-c952-423e-8700-c0525d23304f" providerId="ADAL" clId="{21D76053-4FC2-8046-8E35-708C3EA86774}" dt="2022-08-17T00:34:52.779" v="1" actId="2696"/>
-        <pc:sldMkLst>
-          <pc:docMk/>
-          <pc:sldMk cId="453157801" sldId="305"/>
-        </pc:sldMkLst>
-      </pc:sldChg>
-      <pc:sldChg chg="del">
-        <pc:chgData name="Luciano Pereira Soares" userId="16c53e34-c952-423e-8700-c0525d23304f" providerId="ADAL" clId="{21D76053-4FC2-8046-8E35-708C3EA86774}" dt="2022-08-17T00:34:52.779" v="1" actId="2696"/>
-        <pc:sldMkLst>
-          <pc:docMk/>
-          <pc:sldMk cId="1951566873" sldId="306"/>
-        </pc:sldMkLst>
-      </pc:sldChg>
-      <pc:sldChg chg="del">
-        <pc:chgData name="Luciano Pereira Soares" userId="16c53e34-c952-423e-8700-c0525d23304f" providerId="ADAL" clId="{21D76053-4FC2-8046-8E35-708C3EA86774}" dt="2022-08-17T00:34:52.779" v="1" actId="2696"/>
-        <pc:sldMkLst>
-          <pc:docMk/>
-          <pc:sldMk cId="3878185438" sldId="307"/>
-        </pc:sldMkLst>
-      </pc:sldChg>
-      <pc:sldChg chg="del">
-        <pc:chgData name="Luciano Pereira Soares" userId="16c53e34-c952-423e-8700-c0525d23304f" providerId="ADAL" clId="{21D76053-4FC2-8046-8E35-708C3EA86774}" dt="2022-08-17T00:34:52.779" v="1" actId="2696"/>
-        <pc:sldMkLst>
-          <pc:docMk/>
-          <pc:sldMk cId="3833048560" sldId="308"/>
-        </pc:sldMkLst>
-      </pc:sldChg>
-      <pc:sldChg chg="del">
-        <pc:chgData name="Luciano Pereira Soares" userId="16c53e34-c952-423e-8700-c0525d23304f" providerId="ADAL" clId="{21D76053-4FC2-8046-8E35-708C3EA86774}" dt="2022-08-17T00:34:52.779" v="1" actId="2696"/>
-        <pc:sldMkLst>
-          <pc:docMk/>
-          <pc:sldMk cId="4192908236" sldId="309"/>
-        </pc:sldMkLst>
-      </pc:sldChg>
-      <pc:sldChg chg="del">
-        <pc:chgData name="Luciano Pereira Soares" userId="16c53e34-c952-423e-8700-c0525d23304f" providerId="ADAL" clId="{21D76053-4FC2-8046-8E35-708C3EA86774}" dt="2022-08-17T00:34:52.779" v="1" actId="2696"/>
-        <pc:sldMkLst>
-          <pc:docMk/>
-          <pc:sldMk cId="2450581019" sldId="311"/>
-        </pc:sldMkLst>
-      </pc:sldChg>
-      <pc:sldChg chg="del">
-        <pc:chgData name="Luciano Pereira Soares" userId="16c53e34-c952-423e-8700-c0525d23304f" providerId="ADAL" clId="{21D76053-4FC2-8046-8E35-708C3EA86774}" dt="2022-08-17T00:34:52.779" v="1" actId="2696"/>
-        <pc:sldMkLst>
-          <pc:docMk/>
-          <pc:sldMk cId="2608316626" sldId="312"/>
-        </pc:sldMkLst>
-      </pc:sldChg>
-      <pc:sldChg chg="del">
-        <pc:chgData name="Luciano Pereira Soares" userId="16c53e34-c952-423e-8700-c0525d23304f" providerId="ADAL" clId="{21D76053-4FC2-8046-8E35-708C3EA86774}" dt="2022-08-17T00:34:52.779" v="1" actId="2696"/>
-        <pc:sldMkLst>
-          <pc:docMk/>
-          <pc:sldMk cId="1934957580" sldId="313"/>
-        </pc:sldMkLst>
-      </pc:sldChg>
-      <pc:sldChg chg="del">
-        <pc:chgData name="Luciano Pereira Soares" userId="16c53e34-c952-423e-8700-c0525d23304f" providerId="ADAL" clId="{21D76053-4FC2-8046-8E35-708C3EA86774}" dt="2022-08-17T00:34:52.779" v="1" actId="2696"/>
-        <pc:sldMkLst>
-          <pc:docMk/>
-          <pc:sldMk cId="2807832657" sldId="314"/>
-        </pc:sldMkLst>
-      </pc:sldChg>
-      <pc:sldChg chg="del">
-        <pc:chgData name="Luciano Pereira Soares" userId="16c53e34-c952-423e-8700-c0525d23304f" providerId="ADAL" clId="{21D76053-4FC2-8046-8E35-708C3EA86774}" dt="2022-08-17T00:34:52.779" v="1" actId="2696"/>
-        <pc:sldMkLst>
-          <pc:docMk/>
-          <pc:sldMk cId="1028870872" sldId="315"/>
-        </pc:sldMkLst>
-      </pc:sldChg>
-      <pc:sldChg chg="del">
-        <pc:chgData name="Luciano Pereira Soares" userId="16c53e34-c952-423e-8700-c0525d23304f" providerId="ADAL" clId="{21D76053-4FC2-8046-8E35-708C3EA86774}" dt="2022-08-17T00:34:52.779" v="1" actId="2696"/>
-        <pc:sldMkLst>
-          <pc:docMk/>
-          <pc:sldMk cId="1189783527" sldId="316"/>
-        </pc:sldMkLst>
-      </pc:sldChg>
-      <pc:sldChg chg="del">
-        <pc:chgData name="Luciano Pereira Soares" userId="16c53e34-c952-423e-8700-c0525d23304f" providerId="ADAL" clId="{21D76053-4FC2-8046-8E35-708C3EA86774}" dt="2022-08-17T00:34:52.779" v="1" actId="2696"/>
-        <pc:sldMkLst>
-          <pc:docMk/>
-          <pc:sldMk cId="1798049986" sldId="317"/>
-        </pc:sldMkLst>
-      </pc:sldChg>
-      <pc:sldChg chg="del">
-        <pc:chgData name="Luciano Pereira Soares" userId="16c53e34-c952-423e-8700-c0525d23304f" providerId="ADAL" clId="{21D76053-4FC2-8046-8E35-708C3EA86774}" dt="2022-08-17T00:34:52.779" v="1" actId="2696"/>
-        <pc:sldMkLst>
-          <pc:docMk/>
-          <pc:sldMk cId="1347503315" sldId="318"/>
-        </pc:sldMkLst>
-      </pc:sldChg>
-      <pc:sldChg chg="del">
-        <pc:chgData name="Luciano Pereira Soares" userId="16c53e34-c952-423e-8700-c0525d23304f" providerId="ADAL" clId="{21D76053-4FC2-8046-8E35-708C3EA86774}" dt="2022-08-17T00:34:52.779" v="1" actId="2696"/>
-        <pc:sldMkLst>
-          <pc:docMk/>
-          <pc:sldMk cId="1648801762" sldId="319"/>
-        </pc:sldMkLst>
-      </pc:sldChg>
-      <pc:sldChg chg="del">
-        <pc:chgData name="Luciano Pereira Soares" userId="16c53e34-c952-423e-8700-c0525d23304f" providerId="ADAL" clId="{21D76053-4FC2-8046-8E35-708C3EA86774}" dt="2022-08-17T00:34:52.779" v="1" actId="2696"/>
-        <pc:sldMkLst>
-          <pc:docMk/>
-          <pc:sldMk cId="3080152500" sldId="320"/>
-        </pc:sldMkLst>
-      </pc:sldChg>
-      <pc:sldChg chg="del">
-        <pc:chgData name="Luciano Pereira Soares" userId="16c53e34-c952-423e-8700-c0525d23304f" providerId="ADAL" clId="{21D76053-4FC2-8046-8E35-708C3EA86774}" dt="2022-08-17T00:34:52.779" v="1" actId="2696"/>
-        <pc:sldMkLst>
-          <pc:docMk/>
-          <pc:sldMk cId="1861366562" sldId="321"/>
-        </pc:sldMkLst>
-      </pc:sldChg>
-      <pc:sldChg chg="del">
-        <pc:chgData name="Luciano Pereira Soares" userId="16c53e34-c952-423e-8700-c0525d23304f" providerId="ADAL" clId="{21D76053-4FC2-8046-8E35-708C3EA86774}" dt="2022-08-17T00:34:52.779" v="1" actId="2696"/>
-        <pc:sldMkLst>
-          <pc:docMk/>
-          <pc:sldMk cId="380794106" sldId="322"/>
-        </pc:sldMkLst>
-      </pc:sldChg>
-      <pc:sldChg chg="del">
-        <pc:chgData name="Luciano Pereira Soares" userId="16c53e34-c952-423e-8700-c0525d23304f" providerId="ADAL" clId="{21D76053-4FC2-8046-8E35-708C3EA86774}" dt="2022-08-17T00:34:52.779" v="1" actId="2696"/>
-        <pc:sldMkLst>
-          <pc:docMk/>
-          <pc:sldMk cId="4089055669" sldId="323"/>
-        </pc:sldMkLst>
-      </pc:sldChg>
-      <pc:sldChg chg="del">
-        <pc:chgData name="Luciano Pereira Soares" userId="16c53e34-c952-423e-8700-c0525d23304f" providerId="ADAL" clId="{21D76053-4FC2-8046-8E35-708C3EA86774}" dt="2022-08-17T00:34:52.779" v="1" actId="2696"/>
-        <pc:sldMkLst>
-          <pc:docMk/>
-          <pc:sldMk cId="1832844973" sldId="324"/>
-        </pc:sldMkLst>
-      </pc:sldChg>
-      <pc:sldChg chg="del">
-        <pc:chgData name="Luciano Pereira Soares" userId="16c53e34-c952-423e-8700-c0525d23304f" providerId="ADAL" clId="{21D76053-4FC2-8046-8E35-708C3EA86774}" dt="2022-08-17T00:34:52.779" v="1" actId="2696"/>
-        <pc:sldMkLst>
-          <pc:docMk/>
-          <pc:sldMk cId="157196928" sldId="325"/>
-        </pc:sldMkLst>
-      </pc:sldChg>
-      <pc:sldChg chg="del">
-        <pc:chgData name="Luciano Pereira Soares" userId="16c53e34-c952-423e-8700-c0525d23304f" providerId="ADAL" clId="{21D76053-4FC2-8046-8E35-708C3EA86774}" dt="2022-08-17T00:34:52.779" v="1" actId="2696"/>
-        <pc:sldMkLst>
-          <pc:docMk/>
-          <pc:sldMk cId="1637131583" sldId="326"/>
-        </pc:sldMkLst>
-      </pc:sldChg>
-      <pc:sldChg chg="del">
-        <pc:chgData name="Luciano Pereira Soares" userId="16c53e34-c952-423e-8700-c0525d23304f" providerId="ADAL" clId="{21D76053-4FC2-8046-8E35-708C3EA86774}" dt="2022-08-17T00:34:52.779" v="1" actId="2696"/>
-        <pc:sldMkLst>
-          <pc:docMk/>
-          <pc:sldMk cId="3380530401" sldId="327"/>
-        </pc:sldMkLst>
-      </pc:sldChg>
-      <pc:sldChg chg="del">
-        <pc:chgData name="Luciano Pereira Soares" userId="16c53e34-c952-423e-8700-c0525d23304f" providerId="ADAL" clId="{21D76053-4FC2-8046-8E35-708C3EA86774}" dt="2022-08-17T00:34:52.779" v="1" actId="2696"/>
-        <pc:sldMkLst>
-          <pc:docMk/>
-          <pc:sldMk cId="65727687" sldId="328"/>
-        </pc:sldMkLst>
-      </pc:sldChg>
-      <pc:sldChg chg="del">
-        <pc:chgData name="Luciano Pereira Soares" userId="16c53e34-c952-423e-8700-c0525d23304f" providerId="ADAL" clId="{21D76053-4FC2-8046-8E35-708C3EA86774}" dt="2022-08-17T00:34:52.779" v="1" actId="2696"/>
-        <pc:sldMkLst>
-          <pc:docMk/>
-          <pc:sldMk cId="339457961" sldId="329"/>
-        </pc:sldMkLst>
-      </pc:sldChg>
-      <pc:sldChg chg="del">
-        <pc:chgData name="Luciano Pereira Soares" userId="16c53e34-c952-423e-8700-c0525d23304f" providerId="ADAL" clId="{21D76053-4FC2-8046-8E35-708C3EA86774}" dt="2022-08-17T00:34:52.779" v="1" actId="2696"/>
-        <pc:sldMkLst>
-          <pc:docMk/>
-          <pc:sldMk cId="520571115" sldId="330"/>
-        </pc:sldMkLst>
-      </pc:sldChg>
-      <pc:sldChg chg="del">
-        <pc:chgData name="Luciano Pereira Soares" userId="16c53e34-c952-423e-8700-c0525d23304f" providerId="ADAL" clId="{21D76053-4FC2-8046-8E35-708C3EA86774}" dt="2022-08-17T00:34:52.779" v="1" actId="2696"/>
-        <pc:sldMkLst>
-          <pc:docMk/>
-          <pc:sldMk cId="2164295974" sldId="331"/>
-        </pc:sldMkLst>
-      </pc:sldChg>
-      <pc:sldChg chg="del">
-        <pc:chgData name="Luciano Pereira Soares" userId="16c53e34-c952-423e-8700-c0525d23304f" providerId="ADAL" clId="{21D76053-4FC2-8046-8E35-708C3EA86774}" dt="2022-08-17T00:34:52.779" v="1" actId="2696"/>
-        <pc:sldMkLst>
-          <pc:docMk/>
-          <pc:sldMk cId="771695050" sldId="332"/>
-        </pc:sldMkLst>
-      </pc:sldChg>
-      <pc:sldChg chg="del">
-        <pc:chgData name="Luciano Pereira Soares" userId="16c53e34-c952-423e-8700-c0525d23304f" providerId="ADAL" clId="{21D76053-4FC2-8046-8E35-708C3EA86774}" dt="2022-08-17T00:34:52.779" v="1" actId="2696"/>
-        <pc:sldMkLst>
-          <pc:docMk/>
-          <pc:sldMk cId="3585071933" sldId="333"/>
-        </pc:sldMkLst>
-      </pc:sldChg>
-      <pc:sldChg chg="del">
-        <pc:chgData name="Luciano Pereira Soares" userId="16c53e34-c952-423e-8700-c0525d23304f" providerId="ADAL" clId="{21D76053-4FC2-8046-8E35-708C3EA86774}" dt="2022-08-17T00:34:52.779" v="1" actId="2696"/>
-        <pc:sldMkLst>
-          <pc:docMk/>
-          <pc:sldMk cId="1416409760" sldId="334"/>
-        </pc:sldMkLst>
-      </pc:sldChg>
-      <pc:sldChg chg="del">
-        <pc:chgData name="Luciano Pereira Soares" userId="16c53e34-c952-423e-8700-c0525d23304f" providerId="ADAL" clId="{21D76053-4FC2-8046-8E35-708C3EA86774}" dt="2022-08-17T00:34:52.779" v="1" actId="2696"/>
-        <pc:sldMkLst>
-          <pc:docMk/>
-          <pc:sldMk cId="2257655667" sldId="335"/>
-        </pc:sldMkLst>
-      </pc:sldChg>
-      <pc:sldChg chg="del">
-        <pc:chgData name="Luciano Pereira Soares" userId="16c53e34-c952-423e-8700-c0525d23304f" providerId="ADAL" clId="{21D76053-4FC2-8046-8E35-708C3EA86774}" dt="2022-08-17T00:34:52.779" v="1" actId="2696"/>
-        <pc:sldMkLst>
-          <pc:docMk/>
-          <pc:sldMk cId="3672068477" sldId="336"/>
-        </pc:sldMkLst>
-      </pc:sldChg>
-      <pc:sldChg chg="del">
-        <pc:chgData name="Luciano Pereira Soares" userId="16c53e34-c952-423e-8700-c0525d23304f" providerId="ADAL" clId="{21D76053-4FC2-8046-8E35-708C3EA86774}" dt="2022-08-17T00:34:52.779" v="1" actId="2696"/>
-        <pc:sldMkLst>
-          <pc:docMk/>
-          <pc:sldMk cId="2246476944" sldId="337"/>
-        </pc:sldMkLst>
-      </pc:sldChg>
-      <pc:sldChg chg="del">
-        <pc:chgData name="Luciano Pereira Soares" userId="16c53e34-c952-423e-8700-c0525d23304f" providerId="ADAL" clId="{21D76053-4FC2-8046-8E35-708C3EA86774}" dt="2022-08-17T00:34:52.779" v="1" actId="2696"/>
-        <pc:sldMkLst>
-          <pc:docMk/>
-          <pc:sldMk cId="96632061" sldId="356"/>
-        </pc:sldMkLst>
-      </pc:sldChg>
-      <pc:sldChg chg="del">
-        <pc:chgData name="Luciano Pereira Soares" userId="16c53e34-c952-423e-8700-c0525d23304f" providerId="ADAL" clId="{21D76053-4FC2-8046-8E35-708C3EA86774}" dt="2022-08-17T00:34:52.779" v="1" actId="2696"/>
-        <pc:sldMkLst>
-          <pc:docMk/>
-          <pc:sldMk cId="810874321" sldId="357"/>
-        </pc:sldMkLst>
-      </pc:sldChg>
-      <pc:sldChg chg="del">
-        <pc:chgData name="Luciano Pereira Soares" userId="16c53e34-c952-423e-8700-c0525d23304f" providerId="ADAL" clId="{21D76053-4FC2-8046-8E35-708C3EA86774}" dt="2022-08-17T00:34:52.779" v="1" actId="2696"/>
-        <pc:sldMkLst>
-          <pc:docMk/>
-          <pc:sldMk cId="372318287" sldId="554"/>
-        </pc:sldMkLst>
-      </pc:sldChg>
-      <pc:sldChg chg="del">
-        <pc:chgData name="Luciano Pereira Soares" userId="16c53e34-c952-423e-8700-c0525d23304f" providerId="ADAL" clId="{21D76053-4FC2-8046-8E35-708C3EA86774}" dt="2022-08-17T00:34:52.779" v="1" actId="2696"/>
-        <pc:sldMkLst>
-          <pc:docMk/>
-          <pc:sldMk cId="3155441199" sldId="555"/>
         </pc:sldMkLst>
       </pc:sldChg>
     </pc:docChg>
@@ -8526,7 +8526,7 @@
           <a:p>
             <a:r>
               <a:rPr lang="en-US" dirty="0"/>
-              <a:t>Aula - 05</a:t>
+              <a:t>Aula - 06</a:t>
             </a:r>
           </a:p>
         </p:txBody>

</xml_diff>